<commit_message>
PPUPlayer user manual minor (Current Scan is back)
</commit_message>
<xml_diff>
--- a/UserManual/PPUPlayer/PPU_Player_Eng.pptx
+++ b/UserManual/PPUPlayer/PPU_Player_Eng.pptx
@@ -18,7 +18,8 @@
     <p:sldId id="264" r:id="rId12"/>
     <p:sldId id="265" r:id="rId13"/>
     <p:sldId id="266" r:id="rId14"/>
-    <p:sldId id="267" r:id="rId15"/>
+    <p:sldId id="271" r:id="rId15"/>
+    <p:sldId id="267" r:id="rId16"/>
   </p:sldIdLst>
   <p:sldSz cx="12192000" cy="6858000"/>
   <p:notesSz cx="6858000" cy="9144000"/>
@@ -5108,6 +5109,134 @@
           <p:cNvPr id="2" name="Заголовок 1">
             <a:extLst>
               <a:ext uri="{FF2B5EF4-FFF2-40B4-BE49-F238E27FC236}">
+                <a16:creationId xmlns:a16="http://schemas.microsoft.com/office/drawing/2014/main" id="{F611A4FE-8EB7-5129-30FC-12C89C2D04B4}"/>
+              </a:ext>
+            </a:extLst>
+          </p:cNvPr>
+          <p:cNvSpPr>
+            <a:spLocks noGrp="1"/>
+          </p:cNvSpPr>
+          <p:nvPr>
+            <p:ph type="title"/>
+          </p:nvPr>
+        </p:nvSpPr>
+        <p:spPr/>
+        <p:txBody>
+          <a:bodyPr/>
+          <a:lstStyle/>
+          <a:p>
+            <a:r>
+              <a:rPr lang="en-US" dirty="0"/>
+              <a:t>Current video scanline</a:t>
+            </a:r>
+            <a:endParaRPr lang="ru-RU" dirty="0"/>
+          </a:p>
+        </p:txBody>
+      </p:sp>
+      <p:pic>
+        <p:nvPicPr>
+          <p:cNvPr id="5" name="Объект 4">
+            <a:extLst>
+              <a:ext uri="{FF2B5EF4-FFF2-40B4-BE49-F238E27FC236}">
+                <a16:creationId xmlns:a16="http://schemas.microsoft.com/office/drawing/2014/main" id="{A4487D04-4F24-60A6-9C4B-9D6B625734CE}"/>
+              </a:ext>
+            </a:extLst>
+          </p:cNvPr>
+          <p:cNvPicPr>
+            <a:picLocks noGrp="1" noChangeAspect="1"/>
+          </p:cNvPicPr>
+          <p:nvPr>
+            <p:ph idx="1"/>
+          </p:nvPr>
+        </p:nvPicPr>
+        <p:blipFill>
+          <a:blip r:embed="rId2"/>
+          <a:stretch>
+            <a:fillRect/>
+          </a:stretch>
+        </p:blipFill>
+        <p:spPr>
+          <a:xfrm>
+            <a:off x="1646634" y="1825625"/>
+            <a:ext cx="8898731" cy="4351338"/>
+          </a:xfrm>
+        </p:spPr>
+      </p:pic>
+      <p:sp>
+        <p:nvSpPr>
+          <p:cNvPr id="6" name="TextBox 5">
+            <a:extLst>
+              <a:ext uri="{FF2B5EF4-FFF2-40B4-BE49-F238E27FC236}">
+                <a16:creationId xmlns:a16="http://schemas.microsoft.com/office/drawing/2014/main" id="{BA543780-D9A3-CE87-83EB-2CE7152FDE65}"/>
+              </a:ext>
+            </a:extLst>
+          </p:cNvPr>
+          <p:cNvSpPr txBox="1"/>
+          <p:nvPr/>
+        </p:nvSpPr>
+        <p:spPr>
+          <a:xfrm>
+            <a:off x="7755148" y="6177413"/>
+            <a:ext cx="2790218" cy="369332"/>
+          </a:xfrm>
+          <a:prstGeom prst="rect">
+            <a:avLst/>
+          </a:prstGeom>
+          <a:noFill/>
+        </p:spPr>
+        <p:txBody>
+          <a:bodyPr wrap="square" rtlCol="0">
+            <a:spAutoFit/>
+          </a:bodyPr>
+          <a:lstStyle/>
+          <a:p>
+            <a:r>
+              <a:rPr lang="ru-RU" dirty="0"/>
+              <a:t>(*) </a:t>
+            </a:r>
+            <a:r>
+              <a:rPr lang="en-US" dirty="0"/>
+              <a:t>only for composite PPUs</a:t>
+            </a:r>
+            <a:endParaRPr lang="ru-RU" dirty="0"/>
+          </a:p>
+        </p:txBody>
+      </p:sp>
+    </p:spTree>
+    <p:extLst>
+      <p:ext uri="{BB962C8B-B14F-4D97-AF65-F5344CB8AC3E}">
+        <p14:creationId xmlns:p14="http://schemas.microsoft.com/office/powerpoint/2010/main" val="1900923571"/>
+      </p:ext>
+    </p:extLst>
+  </p:cSld>
+  <p:clrMapOvr>
+    <a:masterClrMapping/>
+  </p:clrMapOvr>
+</p:sld>
+</file>
+
+<file path=ppt/slides/slide15.xml><?xml version="1.0" encoding="utf-8"?>
+<p:sld xmlns:a="http://schemas.openxmlformats.org/drawingml/2006/main" xmlns:r="http://schemas.openxmlformats.org/officeDocument/2006/relationships" xmlns:p="http://schemas.openxmlformats.org/presentationml/2006/main">
+  <p:cSld>
+    <p:spTree>
+      <p:nvGrpSpPr>
+        <p:cNvPr id="1" name=""/>
+        <p:cNvGrpSpPr/>
+        <p:nvPr/>
+      </p:nvGrpSpPr>
+      <p:grpSpPr>
+        <a:xfrm>
+          <a:off x="0" y="0"/>
+          <a:ext cx="0" cy="0"/>
+          <a:chOff x="0" y="0"/>
+          <a:chExt cx="0" cy="0"/>
+        </a:xfrm>
+      </p:grpSpPr>
+      <p:sp>
+        <p:nvSpPr>
+          <p:cNvPr id="2" name="Заголовок 1">
+            <a:extLst>
+              <a:ext uri="{FF2B5EF4-FFF2-40B4-BE49-F238E27FC236}">
                 <a16:creationId xmlns:a16="http://schemas.microsoft.com/office/drawing/2014/main" id="{1A19F3A2-1D92-0AE9-3908-5F3284DDF12A}"/>
               </a:ext>
             </a:extLst>

</xml_diff>